<commit_message>
Convert to MarkBind format
</commit_message>
<xml_diff>
--- a/docs/logo.pptx
+++ b/docs/logo.pptx
@@ -304,7 +304,7 @@
           <a:p>
             <a:fld id="{76DC0EB9-A4B0-4492-AB64-11C80D703AE3}" type="datetimeFigureOut">
               <a:rPr lang="en-SG" smtClean="0"/>
-              <a:t>19/4/2018</a:t>
+              <a:t>28/5/2020</a:t>
             </a:fld>
             <a:endParaRPr lang="en-SG"/>
           </a:p>
@@ -474,7 +474,7 @@
           <a:p>
             <a:fld id="{76DC0EB9-A4B0-4492-AB64-11C80D703AE3}" type="datetimeFigureOut">
               <a:rPr lang="en-SG" smtClean="0"/>
-              <a:t>19/4/2018</a:t>
+              <a:t>28/5/2020</a:t>
             </a:fld>
             <a:endParaRPr lang="en-SG"/>
           </a:p>
@@ -654,7 +654,7 @@
           <a:p>
             <a:fld id="{76DC0EB9-A4B0-4492-AB64-11C80D703AE3}" type="datetimeFigureOut">
               <a:rPr lang="en-SG" smtClean="0"/>
-              <a:t>19/4/2018</a:t>
+              <a:t>28/5/2020</a:t>
             </a:fld>
             <a:endParaRPr lang="en-SG"/>
           </a:p>
@@ -824,7 +824,7 @@
           <a:p>
             <a:fld id="{76DC0EB9-A4B0-4492-AB64-11C80D703AE3}" type="datetimeFigureOut">
               <a:rPr lang="en-SG" smtClean="0"/>
-              <a:t>19/4/2018</a:t>
+              <a:t>28/5/2020</a:t>
             </a:fld>
             <a:endParaRPr lang="en-SG"/>
           </a:p>
@@ -1070,7 +1070,7 @@
           <a:p>
             <a:fld id="{76DC0EB9-A4B0-4492-AB64-11C80D703AE3}" type="datetimeFigureOut">
               <a:rPr lang="en-SG" smtClean="0"/>
-              <a:t>19/4/2018</a:t>
+              <a:t>28/5/2020</a:t>
             </a:fld>
             <a:endParaRPr lang="en-SG"/>
           </a:p>
@@ -1358,7 +1358,7 @@
           <a:p>
             <a:fld id="{76DC0EB9-A4B0-4492-AB64-11C80D703AE3}" type="datetimeFigureOut">
               <a:rPr lang="en-SG" smtClean="0"/>
-              <a:t>19/4/2018</a:t>
+              <a:t>28/5/2020</a:t>
             </a:fld>
             <a:endParaRPr lang="en-SG"/>
           </a:p>
@@ -1780,7 +1780,7 @@
           <a:p>
             <a:fld id="{76DC0EB9-A4B0-4492-AB64-11C80D703AE3}" type="datetimeFigureOut">
               <a:rPr lang="en-SG" smtClean="0"/>
-              <a:t>19/4/2018</a:t>
+              <a:t>28/5/2020</a:t>
             </a:fld>
             <a:endParaRPr lang="en-SG"/>
           </a:p>
@@ -1898,7 +1898,7 @@
           <a:p>
             <a:fld id="{76DC0EB9-A4B0-4492-AB64-11C80D703AE3}" type="datetimeFigureOut">
               <a:rPr lang="en-SG" smtClean="0"/>
-              <a:t>19/4/2018</a:t>
+              <a:t>28/5/2020</a:t>
             </a:fld>
             <a:endParaRPr lang="en-SG"/>
           </a:p>
@@ -1993,7 +1993,7 @@
           <a:p>
             <a:fld id="{76DC0EB9-A4B0-4492-AB64-11C80D703AE3}" type="datetimeFigureOut">
               <a:rPr lang="en-SG" smtClean="0"/>
-              <a:t>19/4/2018</a:t>
+              <a:t>28/5/2020</a:t>
             </a:fld>
             <a:endParaRPr lang="en-SG"/>
           </a:p>
@@ -2270,7 +2270,7 @@
           <a:p>
             <a:fld id="{76DC0EB9-A4B0-4492-AB64-11C80D703AE3}" type="datetimeFigureOut">
               <a:rPr lang="en-SG" smtClean="0"/>
-              <a:t>19/4/2018</a:t>
+              <a:t>28/5/2020</a:t>
             </a:fld>
             <a:endParaRPr lang="en-SG"/>
           </a:p>
@@ -2523,7 +2523,7 @@
           <a:p>
             <a:fld id="{76DC0EB9-A4B0-4492-AB64-11C80D703AE3}" type="datetimeFigureOut">
               <a:rPr lang="en-SG" smtClean="0"/>
-              <a:t>19/4/2018</a:t>
+              <a:t>28/5/2020</a:t>
             </a:fld>
             <a:endParaRPr lang="en-SG"/>
           </a:p>
@@ -2736,7 +2736,7 @@
           <a:p>
             <a:fld id="{76DC0EB9-A4B0-4492-AB64-11C80D703AE3}" type="datetimeFigureOut">
               <a:rPr lang="en-SG" smtClean="0"/>
-              <a:t>19/4/2018</a:t>
+              <a:t>28/5/2020</a:t>
             </a:fld>
             <a:endParaRPr lang="en-SG"/>
           </a:p>
@@ -3701,6 +3701,216 @@
           </a:prstGeom>
         </p:spPr>
       </p:pic>
+      <p:grpSp>
+        <p:nvGrpSpPr>
+          <p:cNvPr id="15" name="Group 14"/>
+          <p:cNvGrpSpPr/>
+          <p:nvPr/>
+        </p:nvGrpSpPr>
+        <p:grpSpPr>
+          <a:xfrm>
+            <a:off x="4755240" y="258313"/>
+            <a:ext cx="1152128" cy="1152128"/>
+            <a:chOff x="1835696" y="3429000"/>
+            <a:chExt cx="1152128" cy="1152128"/>
+          </a:xfrm>
+        </p:grpSpPr>
+        <p:sp>
+          <p:nvSpPr>
+            <p:cNvPr id="17" name="Round Diagonal Corner Rectangle 16"/>
+            <p:cNvSpPr/>
+            <p:nvPr/>
+          </p:nvSpPr>
+          <p:spPr>
+            <a:xfrm>
+              <a:off x="1835696" y="3429000"/>
+              <a:ext cx="1152128" cy="1152128"/>
+            </a:xfrm>
+            <a:prstGeom prst="round2DiagRect">
+              <a:avLst/>
+            </a:prstGeom>
+            <a:solidFill>
+              <a:schemeClr val="bg1"/>
+            </a:solidFill>
+            <a:ln w="28575" cap="rnd">
+              <a:solidFill>
+                <a:schemeClr val="bg1">
+                  <a:lumMod val="85000"/>
+                </a:schemeClr>
+              </a:solidFill>
+            </a:ln>
+          </p:spPr>
+          <p:style>
+            <a:lnRef idx="2">
+              <a:schemeClr val="accent1">
+                <a:shade val="50000"/>
+              </a:schemeClr>
+            </a:lnRef>
+            <a:fillRef idx="1">
+              <a:schemeClr val="accent1"/>
+            </a:fillRef>
+            <a:effectRef idx="0">
+              <a:schemeClr val="accent1"/>
+            </a:effectRef>
+            <a:fontRef idx="minor">
+              <a:schemeClr val="lt1"/>
+            </a:fontRef>
+          </p:style>
+          <p:txBody>
+            <a:bodyPr rtlCol="0" anchor="ctr"/>
+            <a:lstStyle/>
+            <a:p>
+              <a:pPr algn="ctr"/>
+              <a:r>
+                <a:rPr lang="en-US" sz="4000" b="1" dirty="0" smtClean="0">
+                  <a:latin typeface="Lucida Console" panose="020B0609040504020204" pitchFamily="49" charset="0"/>
+                  <a:cs typeface="Consolas" panose="020B0609020204030204" pitchFamily="49" charset="0"/>
+                </a:rPr>
+                <a:t/>
+              </a:r>
+              <a:br>
+                <a:rPr lang="en-US" sz="4000" b="1" dirty="0" smtClean="0">
+                  <a:latin typeface="Lucida Console" panose="020B0609040504020204" pitchFamily="49" charset="0"/>
+                  <a:cs typeface="Consolas" panose="020B0609020204030204" pitchFamily="49" charset="0"/>
+                </a:rPr>
+              </a:br>
+              <a:endParaRPr lang="en-SG" sz="4000" b="1" dirty="0">
+                <a:solidFill>
+                  <a:schemeClr val="accent6">
+                    <a:lumMod val="75000"/>
+                  </a:schemeClr>
+                </a:solidFill>
+                <a:latin typeface="Lucida Console" panose="020B0609040504020204" pitchFamily="49" charset="0"/>
+                <a:cs typeface="Consolas" panose="020B0609020204030204" pitchFamily="49" charset="0"/>
+              </a:endParaRPr>
+            </a:p>
+          </p:txBody>
+        </p:sp>
+        <p:pic>
+          <p:nvPicPr>
+            <p:cNvPr id="18" name="Picture 2"/>
+            <p:cNvPicPr>
+              <a:picLocks noChangeAspect="1" noChangeArrowheads="1"/>
+            </p:cNvPicPr>
+            <p:nvPr/>
+          </p:nvPicPr>
+          <p:blipFill rotWithShape="1">
+            <a:blip r:embed="rId2">
+              <a:extLst>
+                <a:ext uri="{28A0092B-C50C-407E-A947-70E740481C1C}">
+                  <a14:useLocalDpi xmlns:a14="http://schemas.microsoft.com/office/drawing/2010/main" val="0"/>
+                </a:ext>
+              </a:extLst>
+            </a:blip>
+            <a:srcRect l="28963" t="14091" r="27761" b="59014"/>
+            <a:stretch/>
+          </p:blipFill>
+          <p:spPr bwMode="auto">
+            <a:xfrm>
+              <a:off x="1859639" y="3429000"/>
+              <a:ext cx="1128185" cy="720080"/>
+            </a:xfrm>
+            <a:prstGeom prst="rect">
+              <a:avLst/>
+            </a:prstGeom>
+            <a:noFill/>
+            <a:ln>
+              <a:noFill/>
+            </a:ln>
+            <a:effectLst/>
+            <a:extLst>
+              <a:ext uri="{909E8E84-426E-40DD-AFC4-6F175D3DCCD1}">
+                <a14:hiddenFill xmlns:a14="http://schemas.microsoft.com/office/drawing/2010/main">
+                  <a:solidFill>
+                    <a:schemeClr val="accent1"/>
+                  </a:solidFill>
+                </a14:hiddenFill>
+              </a:ext>
+              <a:ext uri="{91240B29-F687-4F45-9708-019B960494DF}">
+                <a14:hiddenLine xmlns:a14="http://schemas.microsoft.com/office/drawing/2010/main" w="9525">
+                  <a:solidFill>
+                    <a:schemeClr val="tx1"/>
+                  </a:solidFill>
+                  <a:miter lim="800000"/>
+                  <a:headEnd/>
+                  <a:tailEnd/>
+                </a14:hiddenLine>
+              </a:ext>
+              <a:ext uri="{AF507438-7753-43E0-B8FC-AC1667EBCBE1}">
+                <a14:hiddenEffects xmlns:a14="http://schemas.microsoft.com/office/drawing/2010/main">
+                  <a:effectLst>
+                    <a:outerShdw dist="35921" dir="2700000" algn="ctr" rotWithShape="0">
+                      <a:schemeClr val="bg2"/>
+                    </a:outerShdw>
+                  </a:effectLst>
+                </a14:hiddenEffects>
+              </a:ext>
+            </a:extLst>
+          </p:spPr>
+        </p:pic>
+        <p:pic>
+          <p:nvPicPr>
+            <p:cNvPr id="19" name="Picture 3"/>
+            <p:cNvPicPr>
+              <a:picLocks noChangeAspect="1" noChangeArrowheads="1"/>
+            </p:cNvPicPr>
+            <p:nvPr/>
+          </p:nvPicPr>
+          <p:blipFill rotWithShape="1">
+            <a:blip r:embed="rId3">
+              <a:extLst>
+                <a:ext uri="{28A0092B-C50C-407E-A947-70E740481C1C}">
+                  <a14:useLocalDpi xmlns:a14="http://schemas.microsoft.com/office/drawing/2010/main" val="0"/>
+                </a:ext>
+              </a:extLst>
+            </a:blip>
+            <a:srcRect l="20548" t="49906" r="19346" b="25047"/>
+            <a:stretch/>
+          </p:blipFill>
+          <p:spPr bwMode="auto">
+            <a:xfrm>
+              <a:off x="1893856" y="4076847"/>
+              <a:ext cx="1041456" cy="429952"/>
+            </a:xfrm>
+            <a:prstGeom prst="rect">
+              <a:avLst/>
+            </a:prstGeom>
+            <a:noFill/>
+            <a:ln>
+              <a:noFill/>
+            </a:ln>
+            <a:effectLst/>
+            <a:extLst>
+              <a:ext uri="{909E8E84-426E-40DD-AFC4-6F175D3DCCD1}">
+                <a14:hiddenFill xmlns:a14="http://schemas.microsoft.com/office/drawing/2010/main">
+                  <a:solidFill>
+                    <a:schemeClr val="accent1"/>
+                  </a:solidFill>
+                </a14:hiddenFill>
+              </a:ext>
+              <a:ext uri="{91240B29-F687-4F45-9708-019B960494DF}">
+                <a14:hiddenLine xmlns:a14="http://schemas.microsoft.com/office/drawing/2010/main" w="9525">
+                  <a:solidFill>
+                    <a:schemeClr val="tx1"/>
+                  </a:solidFill>
+                  <a:miter lim="800000"/>
+                  <a:headEnd/>
+                  <a:tailEnd/>
+                </a14:hiddenLine>
+              </a:ext>
+              <a:ext uri="{AF507438-7753-43E0-B8FC-AC1667EBCBE1}">
+                <a14:hiddenEffects xmlns:a14="http://schemas.microsoft.com/office/drawing/2010/main">
+                  <a:effectLst>
+                    <a:outerShdw dist="35921" dir="2700000" algn="ctr" rotWithShape="0">
+                      <a:schemeClr val="bg2"/>
+                    </a:outerShdw>
+                  </a:effectLst>
+                </a14:hiddenEffects>
+              </a:ext>
+            </a:extLst>
+          </p:spPr>
+        </p:pic>
+      </p:grpSp>
     </p:spTree>
     <p:extLst>
       <p:ext uri="{BB962C8B-B14F-4D97-AF65-F5344CB8AC3E}">

</xml_diff>